<commit_message>
Updated version with autodetection
</commit_message>
<xml_diff>
--- a/docs/ChassisInfoFetcher-Installation guide v01-00.pptx
+++ b/docs/ChassisInfoFetcher-Installation guide v01-00.pptx
@@ -5,17 +5,16 @@
     <p:sldMasterId id="2147483648" r:id="rId1"/>
   </p:sldMasterIdLst>
   <p:notesMasterIdLst>
-    <p:notesMasterId r:id="rId7"/>
+    <p:notesMasterId r:id="rId6"/>
   </p:notesMasterIdLst>
   <p:handoutMasterIdLst>
-    <p:handoutMasterId r:id="rId8"/>
+    <p:handoutMasterId r:id="rId7"/>
   </p:handoutMasterIdLst>
   <p:sldIdLst>
     <p:sldId id="873" r:id="rId2"/>
     <p:sldId id="868" r:id="rId3"/>
     <p:sldId id="869" r:id="rId4"/>
-    <p:sldId id="874" r:id="rId5"/>
-    <p:sldId id="875" r:id="rId6"/>
+    <p:sldId id="875" r:id="rId5"/>
   </p:sldIdLst>
   <p:sldSz cx="9144000" cy="5143500" type="screen16x9"/>
   <p:notesSz cx="7102475" cy="9369425"/>
@@ -326,7 +325,7 @@
               <a:rPr lang="en-US" smtClean="0">
                 <a:latin typeface="Arial" panose="020B0604020202020204" pitchFamily="34" charset="0"/>
               </a:rPr>
-              <a:t>9/5/2016</a:t>
+              <a:t>1/25/17</a:t>
             </a:fld>
             <a:endParaRPr lang="en-US">
               <a:latin typeface="Arial" panose="020B0604020202020204" pitchFamily="34" charset="0"/>
@@ -504,7 +503,7 @@
             <a:fld id="{7B714F60-978E-4B46-A1E7-4610C4949FB2}" type="datetimeFigureOut">
               <a:rPr lang="en-US" smtClean="0"/>
               <a:pPr/>
-              <a:t>9/5/2016</a:t>
+              <a:t>1/25/17</a:t>
             </a:fld>
             <a:endParaRPr lang="en-US"/>
           </a:p>
@@ -1042,96 +1041,6 @@
     </p:spTree>
     <p:extLst>
       <p:ext uri="{BB962C8B-B14F-4D97-AF65-F5344CB8AC3E}">
-        <p14:creationId xmlns:p14="http://schemas.microsoft.com/office/powerpoint/2010/main" val="2624631769"/>
-      </p:ext>
-    </p:extLst>
-  </p:cSld>
-  <p:clrMapOvr>
-    <a:masterClrMapping/>
-  </p:clrMapOvr>
-</p:notes>
-</file>
-
-<file path=ppt/notesSlides/notesSlide4.xml><?xml version="1.0" encoding="utf-8"?>
-<p:notes xmlns:a="http://schemas.openxmlformats.org/drawingml/2006/main" xmlns:r="http://schemas.openxmlformats.org/officeDocument/2006/relationships" xmlns:p="http://schemas.openxmlformats.org/presentationml/2006/main">
-  <p:cSld>
-    <p:spTree>
-      <p:nvGrpSpPr>
-        <p:cNvPr id="1" name=""/>
-        <p:cNvGrpSpPr/>
-        <p:nvPr/>
-      </p:nvGrpSpPr>
-      <p:grpSpPr>
-        <a:xfrm>
-          <a:off x="0" y="0"/>
-          <a:ext cx="0" cy="0"/>
-          <a:chOff x="0" y="0"/>
-          <a:chExt cx="0" cy="0"/>
-        </a:xfrm>
-      </p:grpSpPr>
-      <p:sp>
-        <p:nvSpPr>
-          <p:cNvPr id="2" name="Slide Image Placeholder 1"/>
-          <p:cNvSpPr>
-            <a:spLocks noGrp="1" noRot="1" noChangeAspect="1"/>
-          </p:cNvSpPr>
-          <p:nvPr>
-            <p:ph type="sldImg"/>
-          </p:nvPr>
-        </p:nvSpPr>
-        <p:spPr>
-          <a:xfrm>
-            <a:off x="725488" y="468313"/>
-            <a:ext cx="2895600" cy="1628775"/>
-          </a:xfrm>
-        </p:spPr>
-      </p:sp>
-      <p:sp>
-        <p:nvSpPr>
-          <p:cNvPr id="3" name="Notes Placeholder 2"/>
-          <p:cNvSpPr>
-            <a:spLocks noGrp="1"/>
-          </p:cNvSpPr>
-          <p:nvPr>
-            <p:ph type="body" idx="1"/>
-          </p:nvPr>
-        </p:nvSpPr>
-        <p:spPr/>
-        <p:txBody>
-          <a:bodyPr/>
-          <a:lstStyle/>
-          <a:p>
-            <a:endParaRPr lang="en-US" dirty="0"/>
-          </a:p>
-        </p:txBody>
-      </p:sp>
-      <p:sp>
-        <p:nvSpPr>
-          <p:cNvPr id="4" name="Slide Number Placeholder 3"/>
-          <p:cNvSpPr>
-            <a:spLocks noGrp="1"/>
-          </p:cNvSpPr>
-          <p:nvPr>
-            <p:ph type="sldNum" sz="quarter" idx="10"/>
-          </p:nvPr>
-        </p:nvSpPr>
-        <p:spPr/>
-        <p:txBody>
-          <a:bodyPr/>
-          <a:lstStyle/>
-          <a:p>
-            <a:fld id="{338491A7-CDAE-6648-97E4-398EE75EB383}" type="slidenum">
-              <a:rPr lang="en-US" smtClean="0"/>
-              <a:pPr/>
-              <a:t>5</a:t>
-            </a:fld>
-            <a:endParaRPr lang="en-US"/>
-          </a:p>
-        </p:txBody>
-      </p:sp>
-    </p:spTree>
-    <p:extLst>
-      <p:ext uri="{BB962C8B-B14F-4D97-AF65-F5344CB8AC3E}">
         <p14:creationId xmlns:p14="http://schemas.microsoft.com/office/powerpoint/2010/main" val="1285552483"/>
       </p:ext>
     </p:extLst>
@@ -3665,14 +3574,14 @@
           </a:ln>
           <a:extLst>
             <a:ext uri="{909E8E84-426E-40dd-AFC4-6F175D3DCCD1}">
-              <a14:hiddenFill xmlns:a14="http://schemas.microsoft.com/office/drawing/2010/main" xmlns="">
+              <a14:hiddenFill xmlns="" xmlns:a14="http://schemas.microsoft.com/office/drawing/2010/main">
                 <a:solidFill>
                   <a:srgbClr val="FFFFFF"/>
                 </a:solidFill>
               </a14:hiddenFill>
             </a:ext>
             <a:ext uri="{91240B29-F687-4f45-9708-019B960494DF}">
-              <a14:hiddenLine xmlns:a14="http://schemas.microsoft.com/office/drawing/2010/main" xmlns="" w="12700">
+              <a14:hiddenLine xmlns="" xmlns:a14="http://schemas.microsoft.com/office/drawing/2010/main" w="12700">
                 <a:solidFill>
                   <a:schemeClr val="tx1"/>
                 </a:solidFill>
@@ -4378,55 +4287,6 @@
           </a:p>
         </p:txBody>
       </p:sp>
-      <p:sp>
-        <p:nvSpPr>
-          <p:cNvPr id="4" name="TextBox 3"/>
-          <p:cNvSpPr txBox="1"/>
-          <p:nvPr/>
-        </p:nvSpPr>
-        <p:spPr>
-          <a:xfrm>
-            <a:off x="753888" y="3131821"/>
-            <a:ext cx="5403601" cy="305803"/>
-          </a:xfrm>
-          <a:prstGeom prst="rect">
-            <a:avLst/>
-          </a:prstGeom>
-          <a:ln>
-            <a:noFill/>
-          </a:ln>
-        </p:spPr>
-        <p:txBody>
-          <a:bodyPr wrap="square" lIns="28527" tIns="14263" rIns="28527" bIns="14263" rtlCol="0">
-            <a:spAutoFit/>
-          </a:bodyPr>
-          <a:lstStyle/>
-          <a:p>
-            <a:pPr algn="l">
-              <a:lnSpc>
-                <a:spcPct val="90000"/>
-              </a:lnSpc>
-            </a:pPr>
-            <a:r>
-              <a:rPr lang="en-US" sz="2000" dirty="0" smtClean="0">
-                <a:solidFill>
-                  <a:schemeClr val="accent2"/>
-                </a:solidFill>
-                <a:latin typeface="Arial"/>
-                <a:cs typeface="Arial"/>
-              </a:rPr>
-              <a:t>Alexandru Smeureanu</a:t>
-            </a:r>
-            <a:endParaRPr lang="en-US" sz="2000" dirty="0">
-              <a:solidFill>
-                <a:schemeClr val="accent2"/>
-              </a:solidFill>
-              <a:latin typeface="Arial"/>
-              <a:cs typeface="Arial"/>
-            </a:endParaRPr>
-          </a:p>
-        </p:txBody>
-      </p:sp>
     </p:spTree>
     <p:extLst>
       <p:ext uri="{BB962C8B-B14F-4D97-AF65-F5344CB8AC3E}">
@@ -4521,7 +4381,7 @@
       </p:pic>
       <p:pic>
         <p:nvPicPr>
-          <p:cNvPr id="1036" name="Picture 12" descr="Image result for pypi python"/>
+          <p:cNvPr id="1040" name="Picture 16" descr="Image result for gitlab logo png"/>
           <p:cNvPicPr>
             <a:picLocks noChangeAspect="1" noChangeArrowheads="1"/>
           </p:cNvPicPr>
@@ -4542,8 +4402,8 @@
         </p:blipFill>
         <p:spPr bwMode="auto">
           <a:xfrm>
-            <a:off x="3821987" y="756518"/>
-            <a:ext cx="1757632" cy="1757632"/>
+            <a:off x="6964676" y="845542"/>
+            <a:ext cx="1644752" cy="1803410"/>
           </a:xfrm>
           <a:prstGeom prst="rect">
             <a:avLst/>
@@ -4560,99 +4420,6 @@
           </a:extLst>
         </p:spPr>
       </p:pic>
-      <p:pic>
-        <p:nvPicPr>
-          <p:cNvPr id="1040" name="Picture 16" descr="Image result for gitlab logo png"/>
-          <p:cNvPicPr>
-            <a:picLocks noChangeAspect="1" noChangeArrowheads="1"/>
-          </p:cNvPicPr>
-          <p:nvPr/>
-        </p:nvPicPr>
-        <p:blipFill>
-          <a:blip r:embed="rId4">
-            <a:extLst>
-              <a:ext uri="{28A0092B-C50C-407E-A947-70E740481C1C}">
-                <a14:useLocalDpi xmlns:a14="http://schemas.microsoft.com/office/drawing/2010/main" val="0"/>
-              </a:ext>
-            </a:extLst>
-          </a:blip>
-          <a:srcRect/>
-          <a:stretch>
-            <a:fillRect/>
-          </a:stretch>
-        </p:blipFill>
-        <p:spPr bwMode="auto">
-          <a:xfrm>
-            <a:off x="6964676" y="845542"/>
-            <a:ext cx="1644752" cy="1803410"/>
-          </a:xfrm>
-          <a:prstGeom prst="rect">
-            <a:avLst/>
-          </a:prstGeom>
-          <a:noFill/>
-          <a:extLst>
-            <a:ext uri="{909E8E84-426E-40DD-AFC4-6F175D3DCCD1}">
-              <a14:hiddenFill xmlns:a14="http://schemas.microsoft.com/office/drawing/2010/main">
-                <a:solidFill>
-                  <a:srgbClr val="FFFFFF"/>
-                </a:solidFill>
-              </a14:hiddenFill>
-            </a:ext>
-          </a:extLst>
-        </p:spPr>
-      </p:pic>
-      <p:sp>
-        <p:nvSpPr>
-          <p:cNvPr id="13" name="TextBox 12"/>
-          <p:cNvSpPr txBox="1"/>
-          <p:nvPr/>
-        </p:nvSpPr>
-        <p:spPr>
-          <a:xfrm>
-            <a:off x="3821987" y="2269507"/>
-            <a:ext cx="1982118" cy="489286"/>
-          </a:xfrm>
-          <a:prstGeom prst="rect">
-            <a:avLst/>
-          </a:prstGeom>
-          <a:ln>
-            <a:noFill/>
-          </a:ln>
-        </p:spPr>
-        <p:txBody>
-          <a:bodyPr wrap="none" lIns="45643" tIns="22821" rIns="45643" bIns="22821" rtlCol="0">
-            <a:spAutoFit/>
-          </a:bodyPr>
-          <a:lstStyle/>
-          <a:p>
-            <a:pPr algn="l">
-              <a:lnSpc>
-                <a:spcPct val="90000"/>
-              </a:lnSpc>
-            </a:pPr>
-            <a:r>
-              <a:rPr lang="en-US" sz="3200" b="1" dirty="0" err="1" smtClean="0">
-                <a:solidFill>
-                  <a:schemeClr val="accent2"/>
-                </a:solidFill>
-                <a:latin typeface="Arial"/>
-                <a:cs typeface="Arial"/>
-              </a:rPr>
-              <a:t>PyPI</a:t>
-            </a:r>
-            <a:r>
-              <a:rPr lang="en-US" sz="3200" b="1" dirty="0" smtClean="0">
-                <a:solidFill>
-                  <a:schemeClr val="accent2"/>
-                </a:solidFill>
-                <a:latin typeface="Arial"/>
-                <a:cs typeface="Arial"/>
-              </a:rPr>
-              <a:t> (pip)</a:t>
-            </a:r>
-          </a:p>
-        </p:txBody>
-      </p:sp>
       <p:sp>
         <p:nvSpPr>
           <p:cNvPr id="14" name="TextBox 13"/>
@@ -4729,152 +4496,6 @@
                 <a:cs typeface="Arial"/>
               </a:rPr>
               <a:t>less dependencies problems  </a:t>
-            </a:r>
-            <a:endParaRPr lang="en-US" sz="1400" dirty="0" smtClean="0">
-              <a:solidFill>
-                <a:schemeClr val="accent2"/>
-              </a:solidFill>
-              <a:latin typeface="Arial"/>
-              <a:cs typeface="Arial"/>
-            </a:endParaRPr>
-          </a:p>
-        </p:txBody>
-      </p:sp>
-      <p:sp>
-        <p:nvSpPr>
-          <p:cNvPr id="18" name="TextBox 17"/>
-          <p:cNvSpPr txBox="1"/>
-          <p:nvPr/>
-        </p:nvSpPr>
-        <p:spPr>
-          <a:xfrm>
-            <a:off x="3209759" y="2936389"/>
-            <a:ext cx="3097808" cy="821685"/>
-          </a:xfrm>
-          <a:prstGeom prst="rect">
-            <a:avLst/>
-          </a:prstGeom>
-          <a:ln>
-            <a:noFill/>
-          </a:ln>
-        </p:spPr>
-        <p:txBody>
-          <a:bodyPr wrap="none" lIns="45643" tIns="22821" rIns="45643" bIns="22821" rtlCol="0">
-            <a:spAutoFit/>
-          </a:bodyPr>
-          <a:lstStyle/>
-          <a:p>
-            <a:pPr algn="l">
-              <a:lnSpc>
-                <a:spcPct val="90000"/>
-              </a:lnSpc>
-            </a:pPr>
-            <a:r>
-              <a:rPr lang="en-US" dirty="0" smtClean="0">
-                <a:solidFill>
-                  <a:schemeClr val="accent2"/>
-                </a:solidFill>
-                <a:latin typeface="Arial"/>
-                <a:cs typeface="Arial"/>
-              </a:rPr>
-              <a:t>U</a:t>
-            </a:r>
-            <a:r>
-              <a:rPr lang="en-US" sz="1400" dirty="0" smtClean="0">
-                <a:solidFill>
-                  <a:schemeClr val="accent2"/>
-                </a:solidFill>
-                <a:latin typeface="Arial"/>
-                <a:cs typeface="Arial"/>
-              </a:rPr>
-              <a:t>sing pip &amp; installer package</a:t>
-            </a:r>
-          </a:p>
-          <a:p>
-            <a:pPr marL="285750" indent="-285750" algn="l">
-              <a:lnSpc>
-                <a:spcPct val="90000"/>
-              </a:lnSpc>
-              <a:buFont typeface="Arial" panose="020B0604020202020204" pitchFamily="34" charset="0"/>
-              <a:buChar char="•"/>
-            </a:pPr>
-            <a:r>
-              <a:rPr lang="en-US" dirty="0" smtClean="0">
-                <a:solidFill>
-                  <a:schemeClr val="accent2"/>
-                </a:solidFill>
-                <a:latin typeface="Arial"/>
-                <a:cs typeface="Arial"/>
-              </a:rPr>
-              <a:t>dependencies install automatically</a:t>
-            </a:r>
-          </a:p>
-          <a:p>
-            <a:pPr marL="285750" indent="-285750" algn="l">
-              <a:lnSpc>
-                <a:spcPct val="90000"/>
-              </a:lnSpc>
-              <a:buFont typeface="Arial" panose="020B0604020202020204" pitchFamily="34" charset="0"/>
-              <a:buChar char="•"/>
-            </a:pPr>
-            <a:r>
-              <a:rPr lang="en-US" dirty="0">
-                <a:solidFill>
-                  <a:schemeClr val="accent2"/>
-                </a:solidFill>
-                <a:latin typeface="Arial"/>
-                <a:cs typeface="Arial"/>
-              </a:rPr>
-              <a:t>f</a:t>
-            </a:r>
-            <a:r>
-              <a:rPr lang="en-US" dirty="0" smtClean="0">
-                <a:solidFill>
-                  <a:schemeClr val="accent2"/>
-                </a:solidFill>
-                <a:latin typeface="Arial"/>
-                <a:cs typeface="Arial"/>
-              </a:rPr>
-              <a:t>ollows </a:t>
-            </a:r>
-            <a:r>
-              <a:rPr lang="en-US" dirty="0" err="1" smtClean="0">
-                <a:solidFill>
-                  <a:schemeClr val="accent2"/>
-                </a:solidFill>
-                <a:latin typeface="Arial"/>
-                <a:cs typeface="Arial"/>
-              </a:rPr>
-              <a:t>PyPi</a:t>
-            </a:r>
-            <a:r>
-              <a:rPr lang="en-US" dirty="0" smtClean="0">
-                <a:solidFill>
-                  <a:schemeClr val="accent2"/>
-                </a:solidFill>
-                <a:latin typeface="Arial"/>
-                <a:cs typeface="Arial"/>
-              </a:rPr>
-              <a:t> guidelines</a:t>
-            </a:r>
-          </a:p>
-          <a:p>
-            <a:pPr marL="285750" indent="-285750" algn="l">
-              <a:lnSpc>
-                <a:spcPct val="90000"/>
-              </a:lnSpc>
-              <a:buFont typeface="Arial" panose="020B0604020202020204" pitchFamily="34" charset="0"/>
-              <a:buChar char="•"/>
-            </a:pPr>
-            <a:r>
-              <a:rPr lang="en-US" dirty="0" smtClean="0">
-                <a:solidFill>
-                  <a:schemeClr val="accent2"/>
-                </a:solidFill>
-                <a:latin typeface="Arial"/>
-                <a:cs typeface="Arial"/>
-              </a:rPr>
-              <a:t>little user interaction during install</a:t>
             </a:r>
             <a:endParaRPr lang="en-US" sz="1400" dirty="0" smtClean="0">
               <a:solidFill>
@@ -5041,50 +4662,13 @@
       </p:sp>
       <p:cxnSp>
         <p:nvCxnSpPr>
-          <p:cNvPr id="16" name="Straight Connector 15"/>
-          <p:cNvCxnSpPr/>
-          <p:nvPr/>
-        </p:nvCxnSpPr>
-        <p:spPr>
-          <a:xfrm flipH="1">
-            <a:off x="3077721" y="1014873"/>
-            <a:ext cx="25400" cy="3649134"/>
-          </a:xfrm>
-          <a:prstGeom prst="line">
-            <a:avLst/>
-          </a:prstGeom>
-          <a:ln w="19050">
-            <a:solidFill>
-              <a:schemeClr val="accent2"/>
-            </a:solidFill>
-            <a:miter lim="800000"/>
-          </a:ln>
-          <a:effectLst/>
-        </p:spPr>
-        <p:style>
-          <a:lnRef idx="2">
-            <a:schemeClr val="accent1"/>
-          </a:lnRef>
-          <a:fillRef idx="0">
-            <a:schemeClr val="accent1"/>
-          </a:fillRef>
-          <a:effectRef idx="1">
-            <a:schemeClr val="accent1"/>
-          </a:effectRef>
-          <a:fontRef idx="minor">
-            <a:schemeClr val="tx1"/>
-          </a:fontRef>
-        </p:style>
-      </p:cxnSp>
-      <p:cxnSp>
-        <p:nvCxnSpPr>
           <p:cNvPr id="22" name="Straight Connector 21"/>
           <p:cNvCxnSpPr/>
           <p:nvPr/>
         </p:nvCxnSpPr>
         <p:spPr>
           <a:xfrm flipH="1">
-            <a:off x="6353606" y="1014873"/>
+            <a:off x="4452991" y="845542"/>
             <a:ext cx="25400" cy="3649134"/>
           </a:xfrm>
           <a:prstGeom prst="line">
@@ -5335,7 +4919,7 @@
         <p:spPr>
           <a:xfrm>
             <a:off x="1644225" y="1708633"/>
-            <a:ext cx="7124295" cy="239987"/>
+            <a:ext cx="7443292" cy="239987"/>
           </a:xfrm>
           <a:prstGeom prst="rect">
             <a:avLst/>
@@ -5367,7 +4951,13 @@
               <a:rPr lang="en-US" u="sng" dirty="0">
                 <a:hlinkClick r:id="rId6"/>
               </a:rPr>
-              <a:t>https://git.juniper.net/asmeureanu/ChassisInfoFetcher/raw/master/docker/Dockerfile</a:t>
+              <a:t>https://</a:t>
+            </a:r>
+            <a:r>
+              <a:rPr lang="en-US" u="sng" dirty="0" smtClean="0">
+                <a:hlinkClick r:id="rId6"/>
+              </a:rPr>
+              <a:t>git.juniper.net/mgospodinov/ChassisInfoFetcher2.0/raw/master/docker/Dockerfile</a:t>
             </a:r>
             <a:endParaRPr lang="en-US" sz="1400" dirty="0" smtClean="0">
               <a:solidFill>
@@ -5825,7 +5415,19 @@
           <a:p>
             <a:r>
               <a:rPr lang="en-US" dirty="0" smtClean="0"/>
-              <a:t>Installation using Pip </a:t>
+              <a:t>Installation using source from </a:t>
+            </a:r>
+            <a:r>
+              <a:rPr lang="en-US" dirty="0" err="1" smtClean="0"/>
+              <a:t>GitLab</a:t>
+            </a:r>
+            <a:r>
+              <a:rPr lang="en-US" dirty="0" smtClean="0"/>
+              <a:t> </a:t>
+            </a:r>
+            <a:r>
+              <a:rPr lang="en-US" sz="1800" dirty="0" smtClean="0"/>
+              <a:t>(later GitHub)</a:t>
             </a:r>
             <a:endParaRPr lang="en-US" sz="1800" dirty="0"/>
           </a:p>
@@ -5833,7 +5435,7 @@
       </p:sp>
       <p:sp>
         <p:nvSpPr>
-          <p:cNvPr id="12" name="Title 1"/>
+          <p:cNvPr id="9" name="Title 1"/>
           <p:cNvSpPr txBox="1">
             <a:spLocks/>
           </p:cNvSpPr>
@@ -5841,8 +5443,8 @@
         </p:nvSpPr>
         <p:spPr>
           <a:xfrm>
-            <a:off x="1677628" y="1396272"/>
-            <a:ext cx="4875107" cy="281076"/>
+            <a:off x="238750" y="2377284"/>
+            <a:ext cx="1485548" cy="281076"/>
           </a:xfrm>
           <a:prstGeom prst="rect">
             <a:avLst/>
@@ -5874,7 +5476,7 @@
           <a:p>
             <a:r>
               <a:rPr lang="en-US" sz="1600" b="1" dirty="0" smtClean="0"/>
-              <a:t>Downloading the application</a:t>
+              <a:t>Dependencies</a:t>
             </a:r>
             <a:endParaRPr lang="en-US" sz="1600" b="1" dirty="0"/>
           </a:p>
@@ -5882,7 +5484,54 @@
       </p:sp>
       <p:sp>
         <p:nvSpPr>
-          <p:cNvPr id="16" name="Title 1"/>
+          <p:cNvPr id="8" name="TextBox 7"/>
+          <p:cNvSpPr txBox="1"/>
+          <p:nvPr/>
+        </p:nvSpPr>
+        <p:spPr>
+          <a:xfrm>
+            <a:off x="2459351" y="1407361"/>
+            <a:ext cx="1754492" cy="239987"/>
+          </a:xfrm>
+          <a:prstGeom prst="rect">
+            <a:avLst/>
+          </a:prstGeom>
+          <a:ln>
+            <a:noFill/>
+          </a:ln>
+        </p:spPr>
+        <p:txBody>
+          <a:bodyPr wrap="none" lIns="45643" tIns="22821" rIns="45643" bIns="22821" rtlCol="0">
+            <a:spAutoFit/>
+          </a:bodyPr>
+          <a:lstStyle/>
+          <a:p>
+            <a:pPr>
+              <a:lnSpc>
+                <a:spcPct val="90000"/>
+              </a:lnSpc>
+            </a:pPr>
+            <a:r>
+              <a:rPr lang="en-US" dirty="0"/>
+              <a:t>pip install </a:t>
+            </a:r>
+            <a:r>
+              <a:rPr lang="en-US" dirty="0" err="1"/>
+              <a:t>junos-eznc</a:t>
+            </a:r>
+            <a:endParaRPr lang="en-US" sz="1400" dirty="0" smtClean="0">
+              <a:solidFill>
+                <a:schemeClr val="accent2"/>
+              </a:solidFill>
+              <a:latin typeface="Arial"/>
+              <a:cs typeface="Arial"/>
+            </a:endParaRPr>
+          </a:p>
+        </p:txBody>
+      </p:sp>
+      <p:sp>
+        <p:nvSpPr>
+          <p:cNvPr id="12" name="Title 1"/>
           <p:cNvSpPr txBox="1">
             <a:spLocks/>
           </p:cNvSpPr>
@@ -5890,8 +5539,8 @@
         </p:nvSpPr>
         <p:spPr>
           <a:xfrm>
-            <a:off x="1724297" y="3472286"/>
-            <a:ext cx="5763381" cy="281076"/>
+            <a:off x="2149323" y="1110781"/>
+            <a:ext cx="4875107" cy="281076"/>
           </a:xfrm>
           <a:prstGeom prst="rect">
             <a:avLst/>
@@ -5923,7 +5572,11 @@
           <a:p>
             <a:r>
               <a:rPr lang="en-US" sz="1600" b="1" dirty="0" smtClean="0"/>
-              <a:t>Running the application</a:t>
+              <a:t>Install </a:t>
+            </a:r>
+            <a:r>
+              <a:rPr lang="en-US" sz="1600" b="1" dirty="0" err="1" smtClean="0"/>
+              <a:t>PyEz</a:t>
             </a:r>
             <a:endParaRPr lang="en-US" sz="1600" b="1" dirty="0"/>
           </a:p>
@@ -5931,14 +5584,14 @@
       </p:sp>
       <p:sp>
         <p:nvSpPr>
-          <p:cNvPr id="17" name="TextBox 16"/>
+          <p:cNvPr id="13" name="TextBox 12"/>
           <p:cNvSpPr txBox="1"/>
           <p:nvPr/>
         </p:nvSpPr>
         <p:spPr>
           <a:xfrm>
-            <a:off x="2480916" y="3899663"/>
-            <a:ext cx="1634266" cy="239987"/>
+            <a:off x="2459351" y="1948620"/>
+            <a:ext cx="1316872" cy="239987"/>
           </a:xfrm>
           <a:prstGeom prst="rect">
             <a:avLst/>
@@ -5959,8 +5612,12 @@
               </a:lnSpc>
             </a:pPr>
             <a:r>
-              <a:rPr lang="en-US" dirty="0" err="1" smtClean="0"/>
-              <a:t>ChassisInfoFetcher</a:t>
+              <a:rPr lang="en-US" dirty="0"/>
+              <a:t>pip install </a:t>
+            </a:r>
+            <a:r>
+              <a:rPr lang="en-US" dirty="0" err="1"/>
+              <a:t>urwid</a:t>
             </a:r>
             <a:endParaRPr lang="en-US" sz="1400" dirty="0" smtClean="0">
               <a:solidFill>
@@ -5972,262 +5629,9 @@
           </a:p>
         </p:txBody>
       </p:sp>
-      <p:cxnSp>
-        <p:nvCxnSpPr>
-          <p:cNvPr id="24" name="Straight Connector 23"/>
-          <p:cNvCxnSpPr/>
-          <p:nvPr/>
-        </p:nvCxnSpPr>
-        <p:spPr>
-          <a:xfrm>
-            <a:off x="1741927" y="3390426"/>
-            <a:ext cx="5111932" cy="8709"/>
-          </a:xfrm>
-          <a:prstGeom prst="line">
-            <a:avLst/>
-          </a:prstGeom>
-          <a:ln w="19050">
-            <a:solidFill>
-              <a:schemeClr val="accent2"/>
-            </a:solidFill>
-            <a:miter lim="800000"/>
-          </a:ln>
-          <a:effectLst/>
-        </p:spPr>
-        <p:style>
-          <a:lnRef idx="2">
-            <a:schemeClr val="accent1"/>
-          </a:lnRef>
-          <a:fillRef idx="0">
-            <a:schemeClr val="accent1"/>
-          </a:fillRef>
-          <a:effectRef idx="1">
-            <a:schemeClr val="accent1"/>
-          </a:effectRef>
-          <a:fontRef idx="minor">
-            <a:schemeClr val="tx1"/>
-          </a:fontRef>
-        </p:style>
-      </p:cxnSp>
-      <p:pic>
-        <p:nvPicPr>
-          <p:cNvPr id="11" name="Picture 10"/>
-          <p:cNvPicPr>
-            <a:picLocks noChangeAspect="1"/>
-          </p:cNvPicPr>
-          <p:nvPr/>
-        </p:nvPicPr>
-        <p:blipFill>
-          <a:blip r:embed="rId3"/>
-          <a:stretch>
-            <a:fillRect/>
-          </a:stretch>
-        </p:blipFill>
-        <p:spPr>
-          <a:xfrm>
-            <a:off x="487441" y="3472286"/>
-            <a:ext cx="840856" cy="854754"/>
-          </a:xfrm>
-          <a:prstGeom prst="rect">
-            <a:avLst/>
-          </a:prstGeom>
-        </p:spPr>
-      </p:pic>
-      <p:pic>
-        <p:nvPicPr>
-          <p:cNvPr id="26" name="Picture 12" descr="Image result for pypi python"/>
-          <p:cNvPicPr>
-            <a:picLocks noChangeAspect="1" noChangeArrowheads="1"/>
-          </p:cNvPicPr>
-          <p:nvPr/>
-        </p:nvPicPr>
-        <p:blipFill>
-          <a:blip r:embed="rId4">
-            <a:extLst>
-              <a:ext uri="{28A0092B-C50C-407E-A947-70E740481C1C}">
-                <a14:useLocalDpi xmlns:a14="http://schemas.microsoft.com/office/drawing/2010/main" val="0"/>
-              </a:ext>
-            </a:extLst>
-          </a:blip>
-          <a:srcRect/>
-          <a:stretch>
-            <a:fillRect/>
-          </a:stretch>
-        </p:blipFill>
-        <p:spPr bwMode="auto">
-          <a:xfrm>
-            <a:off x="102708" y="-143053"/>
-            <a:ext cx="1757632" cy="1757632"/>
-          </a:xfrm>
-          <a:prstGeom prst="rect">
-            <a:avLst/>
-          </a:prstGeom>
-          <a:noFill/>
-          <a:extLst>
-            <a:ext uri="{909E8E84-426E-40DD-AFC4-6F175D3DCCD1}">
-              <a14:hiddenFill xmlns:a14="http://schemas.microsoft.com/office/drawing/2010/main">
-                <a:solidFill>
-                  <a:srgbClr val="FFFFFF"/>
-                </a:solidFill>
-              </a14:hiddenFill>
-            </a:ext>
-          </a:extLst>
-        </p:spPr>
-      </p:pic>
-      <p:pic>
-        <p:nvPicPr>
-          <p:cNvPr id="27" name="Picture 26"/>
-          <p:cNvPicPr>
-            <a:picLocks noChangeAspect="1"/>
-          </p:cNvPicPr>
-          <p:nvPr/>
-        </p:nvPicPr>
-        <p:blipFill>
-          <a:blip r:embed="rId5"/>
-          <a:stretch>
-            <a:fillRect/>
-          </a:stretch>
-        </p:blipFill>
-        <p:spPr>
-          <a:xfrm>
-            <a:off x="564311" y="1480005"/>
-            <a:ext cx="763986" cy="763986"/>
-          </a:xfrm>
-          <a:prstGeom prst="rect">
-            <a:avLst/>
-          </a:prstGeom>
-        </p:spPr>
-      </p:pic>
-      <p:pic>
-        <p:nvPicPr>
-          <p:cNvPr id="29" name="Picture 28"/>
-          <p:cNvPicPr>
-            <a:picLocks noChangeAspect="1"/>
-          </p:cNvPicPr>
-          <p:nvPr/>
-        </p:nvPicPr>
-        <p:blipFill>
-          <a:blip r:embed="rId6"/>
-          <a:stretch>
-            <a:fillRect/>
-          </a:stretch>
-        </p:blipFill>
-        <p:spPr>
-          <a:xfrm>
-            <a:off x="614440" y="2659101"/>
-            <a:ext cx="636987" cy="636987"/>
-          </a:xfrm>
-          <a:prstGeom prst="rect">
-            <a:avLst/>
-          </a:prstGeom>
-        </p:spPr>
-      </p:pic>
-      <p:cxnSp>
-        <p:nvCxnSpPr>
-          <p:cNvPr id="30" name="Straight Connector 29"/>
-          <p:cNvCxnSpPr/>
-          <p:nvPr/>
-        </p:nvCxnSpPr>
-        <p:spPr>
-          <a:xfrm>
-            <a:off x="1724297" y="2334785"/>
-            <a:ext cx="5111932" cy="8709"/>
-          </a:xfrm>
-          <a:prstGeom prst="line">
-            <a:avLst/>
-          </a:prstGeom>
-          <a:ln w="19050">
-            <a:solidFill>
-              <a:schemeClr val="accent2"/>
-            </a:solidFill>
-            <a:miter lim="800000"/>
-          </a:ln>
-          <a:effectLst/>
-        </p:spPr>
-        <p:style>
-          <a:lnRef idx="2">
-            <a:schemeClr val="accent1"/>
-          </a:lnRef>
-          <a:fillRef idx="0">
-            <a:schemeClr val="accent1"/>
-          </a:fillRef>
-          <a:effectRef idx="1">
-            <a:schemeClr val="accent1"/>
-          </a:effectRef>
-          <a:fontRef idx="minor">
-            <a:schemeClr val="tx1"/>
-          </a:fontRef>
-        </p:style>
-      </p:cxnSp>
       <p:sp>
         <p:nvSpPr>
-          <p:cNvPr id="31" name="TextBox 30"/>
-          <p:cNvSpPr txBox="1"/>
-          <p:nvPr/>
-        </p:nvSpPr>
-        <p:spPr>
-          <a:xfrm>
-            <a:off x="1860340" y="1789370"/>
-            <a:ext cx="5469740" cy="433886"/>
-          </a:xfrm>
-          <a:prstGeom prst="rect">
-            <a:avLst/>
-          </a:prstGeom>
-          <a:ln>
-            <a:noFill/>
-          </a:ln>
-        </p:spPr>
-        <p:txBody>
-          <a:bodyPr wrap="none" lIns="45643" tIns="22821" rIns="45643" bIns="22821" rtlCol="0">
-            <a:spAutoFit/>
-          </a:bodyPr>
-          <a:lstStyle/>
-          <a:p>
-            <a:pPr>
-              <a:lnSpc>
-                <a:spcPct val="90000"/>
-              </a:lnSpc>
-            </a:pPr>
-            <a:r>
-              <a:rPr lang="en-US" dirty="0" err="1"/>
-              <a:t>wget</a:t>
-            </a:r>
-            <a:r>
-              <a:rPr lang="en-US" dirty="0"/>
-              <a:t> </a:t>
-            </a:r>
-            <a:r>
-              <a:rPr lang="en-US" u="sng" dirty="0"/>
-              <a:t>https://</a:t>
-            </a:r>
-            <a:r>
-              <a:rPr lang="en-US" u="sng" dirty="0" smtClean="0"/>
-              <a:t>git.juniper.net/asmeureanu/ChassisInfoFetcher/raw</a:t>
-            </a:r>
-          </a:p>
-          <a:p>
-            <a:pPr>
-              <a:lnSpc>
-                <a:spcPct val="90000"/>
-              </a:lnSpc>
-            </a:pPr>
-            <a:r>
-              <a:rPr lang="en-US" u="sng" dirty="0" smtClean="0"/>
-              <a:t>/master/installer/bin/ChassisInfoFecher-latest-py2.py3-none-any.whl</a:t>
-            </a:r>
-            <a:endParaRPr lang="en-US" sz="1400" dirty="0" smtClean="0">
-              <a:solidFill>
-                <a:schemeClr val="accent2"/>
-              </a:solidFill>
-              <a:latin typeface="Arial"/>
-              <a:cs typeface="Arial"/>
-            </a:endParaRPr>
-          </a:p>
-        </p:txBody>
-      </p:sp>
-      <p:sp>
-        <p:nvSpPr>
-          <p:cNvPr id="32" name="Title 1"/>
+          <p:cNvPr id="14" name="Title 1"/>
           <p:cNvSpPr txBox="1">
             <a:spLocks/>
           </p:cNvSpPr>
@@ -6235,8 +5639,8 @@
         </p:nvSpPr>
         <p:spPr>
           <a:xfrm>
-            <a:off x="1677628" y="2505688"/>
-            <a:ext cx="5763381" cy="281076"/>
+            <a:off x="2149323" y="3126381"/>
+            <a:ext cx="4875107" cy="281076"/>
           </a:xfrm>
           <a:prstGeom prst="rect">
             <a:avLst/>
@@ -6268,7 +5672,7 @@
           <a:p>
             <a:r>
               <a:rPr lang="en-US" sz="1600" b="1" dirty="0" smtClean="0"/>
-              <a:t>Install the application</a:t>
+              <a:t>Installing the application</a:t>
             </a:r>
             <a:endParaRPr lang="en-US" sz="1600" b="1" dirty="0"/>
           </a:p>
@@ -6276,14 +5680,14 @@
       </p:sp>
       <p:sp>
         <p:nvSpPr>
-          <p:cNvPr id="33" name="TextBox 32"/>
+          <p:cNvPr id="15" name="TextBox 14"/>
           <p:cNvSpPr txBox="1"/>
           <p:nvPr/>
         </p:nvSpPr>
         <p:spPr>
           <a:xfrm>
-            <a:off x="1900613" y="2821457"/>
-            <a:ext cx="4714725" cy="239987"/>
+            <a:off x="2459351" y="3459962"/>
+            <a:ext cx="5364198" cy="239987"/>
           </a:xfrm>
           <a:prstGeom prst="rect">
             <a:avLst/>
@@ -6304,18 +5708,34 @@
               </a:lnSpc>
             </a:pPr>
             <a:r>
+              <a:rPr lang="en-US" dirty="0" err="1"/>
+              <a:t>git</a:t>
+            </a:r>
+            <a:r>
               <a:rPr lang="en-US" dirty="0"/>
-              <a:t>p</a:t>
-            </a:r>
-            <a:r>
-              <a:rPr lang="en-US" dirty="0" smtClean="0"/>
-              <a:t>ip </a:t>
+              <a:t> clone </a:t>
             </a:r>
             <a:r>
               <a:rPr lang="en-US" dirty="0"/>
-              <a:t>install ChassisInfoFetcher-latest-py2.py3-none-any.whl</a:t>
-            </a:r>
-            <a:endParaRPr lang="en-US" sz="1400" dirty="0" smtClean="0">
+              <a:t>https://</a:t>
+            </a:r>
+            <a:r>
+              <a:rPr lang="en-US" dirty="0" err="1"/>
+              <a:t>git.juniper.net</a:t>
+            </a:r>
+            <a:r>
+              <a:rPr lang="en-US" dirty="0"/>
+              <a:t>/</a:t>
+            </a:r>
+            <a:r>
+              <a:rPr lang="en-US" dirty="0" err="1"/>
+              <a:t>mgospodinov</a:t>
+            </a:r>
+            <a:r>
+              <a:rPr lang="en-US" dirty="0"/>
+              <a:t>/ChassisInfoFetcher2.0</a:t>
+            </a:r>
+            <a:endParaRPr lang="en-US" dirty="0" smtClean="0">
               <a:solidFill>
                 <a:schemeClr val="accent2"/>
               </a:solidFill>
@@ -6325,98 +5745,9 @@
           </a:p>
         </p:txBody>
       </p:sp>
-    </p:spTree>
-    <p:extLst>
-      <p:ext uri="{BB962C8B-B14F-4D97-AF65-F5344CB8AC3E}">
-        <p14:creationId xmlns:p14="http://schemas.microsoft.com/office/powerpoint/2010/main" val="3716161024"/>
-      </p:ext>
-    </p:extLst>
-  </p:cSld>
-  <p:clrMapOvr>
-    <a:masterClrMapping/>
-  </p:clrMapOvr>
-  <mc:AlternateContent xmlns:mc="http://schemas.openxmlformats.org/markup-compatibility/2006" xmlns:p14="http://schemas.microsoft.com/office/powerpoint/2010/main">
-    <mc:Choice Requires="p14">
-      <p:transition spd="med" p14:dur="700">
-        <p:fade/>
-      </p:transition>
-    </mc:Choice>
-    <mc:Fallback xmlns="">
-      <p:transition spd="med">
-        <p:fade/>
-      </p:transition>
-    </mc:Fallback>
-  </mc:AlternateContent>
-  <p:timing>
-    <p:tnLst>
-      <p:par>
-        <p:cTn id="1" dur="indefinite" restart="never" nodeType="tmRoot"/>
-      </p:par>
-    </p:tnLst>
-  </p:timing>
-</p:sld>
-</file>
-
-<file path=ppt/slides/slide5.xml><?xml version="1.0" encoding="utf-8"?>
-<p:sld xmlns:a="http://schemas.openxmlformats.org/drawingml/2006/main" xmlns:r="http://schemas.openxmlformats.org/officeDocument/2006/relationships" xmlns:p="http://schemas.openxmlformats.org/presentationml/2006/main">
-  <p:cSld>
-    <p:spTree>
-      <p:nvGrpSpPr>
-        <p:cNvPr id="1" name=""/>
-        <p:cNvGrpSpPr/>
-        <p:nvPr/>
-      </p:nvGrpSpPr>
-      <p:grpSpPr>
-        <a:xfrm>
-          <a:off x="0" y="0"/>
-          <a:ext cx="0" cy="0"/>
-          <a:chOff x="0" y="0"/>
-          <a:chExt cx="0" cy="0"/>
-        </a:xfrm>
-      </p:grpSpPr>
       <p:sp>
         <p:nvSpPr>
-          <p:cNvPr id="6" name="Title 1"/>
-          <p:cNvSpPr>
-            <a:spLocks noGrp="1"/>
-          </p:cNvSpPr>
-          <p:nvPr>
-            <p:ph type="title"/>
-          </p:nvPr>
-        </p:nvSpPr>
-        <p:spPr>
-          <a:xfrm>
-            <a:off x="1724297" y="498263"/>
-            <a:ext cx="7144174" cy="416372"/>
-          </a:xfrm>
-        </p:spPr>
-        <p:txBody>
-          <a:bodyPr/>
-          <a:lstStyle/>
-          <a:p>
-            <a:r>
-              <a:rPr lang="en-US" dirty="0" smtClean="0"/>
-              <a:t>Installation using source from </a:t>
-            </a:r>
-            <a:r>
-              <a:rPr lang="en-US" dirty="0" err="1" smtClean="0"/>
-              <a:t>GitLab</a:t>
-            </a:r>
-            <a:r>
-              <a:rPr lang="en-US" dirty="0" smtClean="0"/>
-              <a:t> </a:t>
-            </a:r>
-            <a:r>
-              <a:rPr lang="en-US" sz="1800" dirty="0" smtClean="0"/>
-              <a:t>(later GitHub)</a:t>
-            </a:r>
-            <a:endParaRPr lang="en-US" sz="1800" dirty="0"/>
-          </a:p>
-        </p:txBody>
-      </p:sp>
-      <p:sp>
-        <p:nvSpPr>
-          <p:cNvPr id="9" name="Title 1"/>
+          <p:cNvPr id="16" name="Title 1"/>
           <p:cNvSpPr txBox="1">
             <a:spLocks/>
           </p:cNvSpPr>
@@ -6424,8 +5755,8 @@
         </p:nvSpPr>
         <p:spPr>
           <a:xfrm>
-            <a:off x="238750" y="2377284"/>
-            <a:ext cx="1485548" cy="281076"/>
+            <a:off x="2149323" y="3905096"/>
+            <a:ext cx="5763381" cy="281076"/>
           </a:xfrm>
           <a:prstGeom prst="rect">
             <a:avLst/>
@@ -6457,304 +5788,6 @@
           <a:p>
             <a:r>
               <a:rPr lang="en-US" sz="1600" b="1" dirty="0" smtClean="0"/>
-              <a:t>Dependencies</a:t>
-            </a:r>
-            <a:endParaRPr lang="en-US" sz="1600" b="1" dirty="0"/>
-          </a:p>
-        </p:txBody>
-      </p:sp>
-      <p:sp>
-        <p:nvSpPr>
-          <p:cNvPr id="8" name="TextBox 7"/>
-          <p:cNvSpPr txBox="1"/>
-          <p:nvPr/>
-        </p:nvSpPr>
-        <p:spPr>
-          <a:xfrm>
-            <a:off x="2459351" y="1407361"/>
-            <a:ext cx="1754492" cy="239987"/>
-          </a:xfrm>
-          <a:prstGeom prst="rect">
-            <a:avLst/>
-          </a:prstGeom>
-          <a:ln>
-            <a:noFill/>
-          </a:ln>
-        </p:spPr>
-        <p:txBody>
-          <a:bodyPr wrap="none" lIns="45643" tIns="22821" rIns="45643" bIns="22821" rtlCol="0">
-            <a:spAutoFit/>
-          </a:bodyPr>
-          <a:lstStyle/>
-          <a:p>
-            <a:pPr>
-              <a:lnSpc>
-                <a:spcPct val="90000"/>
-              </a:lnSpc>
-            </a:pPr>
-            <a:r>
-              <a:rPr lang="en-US" dirty="0"/>
-              <a:t>pip install </a:t>
-            </a:r>
-            <a:r>
-              <a:rPr lang="en-US" dirty="0" err="1"/>
-              <a:t>junos-eznc</a:t>
-            </a:r>
-            <a:endParaRPr lang="en-US" sz="1400" dirty="0" smtClean="0">
-              <a:solidFill>
-                <a:schemeClr val="accent2"/>
-              </a:solidFill>
-              <a:latin typeface="Arial"/>
-              <a:cs typeface="Arial"/>
-            </a:endParaRPr>
-          </a:p>
-        </p:txBody>
-      </p:sp>
-      <p:sp>
-        <p:nvSpPr>
-          <p:cNvPr id="12" name="Title 1"/>
-          <p:cNvSpPr txBox="1">
-            <a:spLocks/>
-          </p:cNvSpPr>
-          <p:nvPr/>
-        </p:nvSpPr>
-        <p:spPr>
-          <a:xfrm>
-            <a:off x="2149323" y="1110781"/>
-            <a:ext cx="4875107" cy="281076"/>
-          </a:xfrm>
-          <a:prstGeom prst="rect">
-            <a:avLst/>
-          </a:prstGeom>
-        </p:spPr>
-        <p:txBody>
-          <a:bodyPr wrap="square" lIns="57148" tIns="0" rIns="0" bIns="0" anchor="b" anchorCtr="0">
-            <a:noAutofit/>
-          </a:bodyPr>
-          <a:lstStyle>
-            <a:lvl1pPr algn="l" defTabSz="342863" rtl="0" eaLnBrk="1" latinLnBrk="0" hangingPunct="1">
-              <a:lnSpc>
-                <a:spcPct val="90000"/>
-              </a:lnSpc>
-              <a:spcBef>
-                <a:spcPts val="250"/>
-              </a:spcBef>
-              <a:buNone/>
-              <a:defRPr lang="en-US" sz="2800" b="0" i="0" kern="1200" spc="-38" baseline="0">
-                <a:solidFill>
-                  <a:schemeClr val="tx1"/>
-                </a:solidFill>
-                <a:latin typeface="Arial"/>
-                <a:ea typeface="+mn-ea"/>
-                <a:cs typeface="Arial"/>
-              </a:defRPr>
-            </a:lvl1pPr>
-          </a:lstStyle>
-          <a:p>
-            <a:r>
-              <a:rPr lang="en-US" sz="1600" b="1" dirty="0" smtClean="0"/>
-              <a:t>Install </a:t>
-            </a:r>
-            <a:r>
-              <a:rPr lang="en-US" sz="1600" b="1" dirty="0" err="1" smtClean="0"/>
-              <a:t>PyEz</a:t>
-            </a:r>
-            <a:endParaRPr lang="en-US" sz="1600" b="1" dirty="0"/>
-          </a:p>
-        </p:txBody>
-      </p:sp>
-      <p:sp>
-        <p:nvSpPr>
-          <p:cNvPr id="13" name="TextBox 12"/>
-          <p:cNvSpPr txBox="1"/>
-          <p:nvPr/>
-        </p:nvSpPr>
-        <p:spPr>
-          <a:xfrm>
-            <a:off x="2459351" y="1948620"/>
-            <a:ext cx="1316872" cy="239987"/>
-          </a:xfrm>
-          <a:prstGeom prst="rect">
-            <a:avLst/>
-          </a:prstGeom>
-          <a:ln>
-            <a:noFill/>
-          </a:ln>
-        </p:spPr>
-        <p:txBody>
-          <a:bodyPr wrap="none" lIns="45643" tIns="22821" rIns="45643" bIns="22821" rtlCol="0">
-            <a:spAutoFit/>
-          </a:bodyPr>
-          <a:lstStyle/>
-          <a:p>
-            <a:pPr>
-              <a:lnSpc>
-                <a:spcPct val="90000"/>
-              </a:lnSpc>
-            </a:pPr>
-            <a:r>
-              <a:rPr lang="en-US" dirty="0"/>
-              <a:t>pip install </a:t>
-            </a:r>
-            <a:r>
-              <a:rPr lang="en-US" dirty="0" err="1"/>
-              <a:t>urwid</a:t>
-            </a:r>
-            <a:endParaRPr lang="en-US" sz="1400" dirty="0" smtClean="0">
-              <a:solidFill>
-                <a:schemeClr val="accent2"/>
-              </a:solidFill>
-              <a:latin typeface="Arial"/>
-              <a:cs typeface="Arial"/>
-            </a:endParaRPr>
-          </a:p>
-        </p:txBody>
-      </p:sp>
-      <p:sp>
-        <p:nvSpPr>
-          <p:cNvPr id="14" name="Title 1"/>
-          <p:cNvSpPr txBox="1">
-            <a:spLocks/>
-          </p:cNvSpPr>
-          <p:nvPr/>
-        </p:nvSpPr>
-        <p:spPr>
-          <a:xfrm>
-            <a:off x="2149323" y="3126381"/>
-            <a:ext cx="4875107" cy="281076"/>
-          </a:xfrm>
-          <a:prstGeom prst="rect">
-            <a:avLst/>
-          </a:prstGeom>
-        </p:spPr>
-        <p:txBody>
-          <a:bodyPr wrap="square" lIns="57148" tIns="0" rIns="0" bIns="0" anchor="b" anchorCtr="0">
-            <a:noAutofit/>
-          </a:bodyPr>
-          <a:lstStyle>
-            <a:lvl1pPr algn="l" defTabSz="342863" rtl="0" eaLnBrk="1" latinLnBrk="0" hangingPunct="1">
-              <a:lnSpc>
-                <a:spcPct val="90000"/>
-              </a:lnSpc>
-              <a:spcBef>
-                <a:spcPts val="250"/>
-              </a:spcBef>
-              <a:buNone/>
-              <a:defRPr lang="en-US" sz="2800" b="0" i="0" kern="1200" spc="-38" baseline="0">
-                <a:solidFill>
-                  <a:schemeClr val="tx1"/>
-                </a:solidFill>
-                <a:latin typeface="Arial"/>
-                <a:ea typeface="+mn-ea"/>
-                <a:cs typeface="Arial"/>
-              </a:defRPr>
-            </a:lvl1pPr>
-          </a:lstStyle>
-          <a:p>
-            <a:r>
-              <a:rPr lang="en-US" sz="1600" b="1" dirty="0" smtClean="0"/>
-              <a:t>Installing the application</a:t>
-            </a:r>
-            <a:endParaRPr lang="en-US" sz="1600" b="1" dirty="0"/>
-          </a:p>
-        </p:txBody>
-      </p:sp>
-      <p:sp>
-        <p:nvSpPr>
-          <p:cNvPr id="15" name="TextBox 14"/>
-          <p:cNvSpPr txBox="1"/>
-          <p:nvPr/>
-        </p:nvSpPr>
-        <p:spPr>
-          <a:xfrm>
-            <a:off x="2459351" y="3459962"/>
-            <a:ext cx="5274173" cy="239987"/>
-          </a:xfrm>
-          <a:prstGeom prst="rect">
-            <a:avLst/>
-          </a:prstGeom>
-          <a:ln>
-            <a:noFill/>
-          </a:ln>
-        </p:spPr>
-        <p:txBody>
-          <a:bodyPr wrap="none" lIns="45643" tIns="22821" rIns="45643" bIns="22821" rtlCol="0">
-            <a:spAutoFit/>
-          </a:bodyPr>
-          <a:lstStyle/>
-          <a:p>
-            <a:pPr>
-              <a:lnSpc>
-                <a:spcPct val="90000"/>
-              </a:lnSpc>
-            </a:pPr>
-            <a:r>
-              <a:rPr lang="en-US" dirty="0" err="1"/>
-              <a:t>git</a:t>
-            </a:r>
-            <a:r>
-              <a:rPr lang="en-US" dirty="0"/>
-              <a:t> clone </a:t>
-            </a:r>
-            <a:r>
-              <a:rPr lang="en-US" dirty="0">
-                <a:hlinkClick r:id="rId3"/>
-              </a:rPr>
-              <a:t>https://git.juniper.net/asmeureanu/ChassisInfoFetcher.git</a:t>
-            </a:r>
-            <a:endParaRPr lang="en-US" dirty="0" smtClean="0">
-              <a:solidFill>
-                <a:schemeClr val="accent2"/>
-              </a:solidFill>
-              <a:latin typeface="Arial"/>
-              <a:cs typeface="Arial"/>
-            </a:endParaRPr>
-          </a:p>
-        </p:txBody>
-      </p:sp>
-      <p:sp>
-        <p:nvSpPr>
-          <p:cNvPr id="16" name="Title 1"/>
-          <p:cNvSpPr txBox="1">
-            <a:spLocks/>
-          </p:cNvSpPr>
-          <p:nvPr/>
-        </p:nvSpPr>
-        <p:spPr>
-          <a:xfrm>
-            <a:off x="2149323" y="3905096"/>
-            <a:ext cx="5763381" cy="281076"/>
-          </a:xfrm>
-          <a:prstGeom prst="rect">
-            <a:avLst/>
-          </a:prstGeom>
-        </p:spPr>
-        <p:txBody>
-          <a:bodyPr wrap="square" lIns="57148" tIns="0" rIns="0" bIns="0" anchor="b" anchorCtr="0">
-            <a:noAutofit/>
-          </a:bodyPr>
-          <a:lstStyle>
-            <a:lvl1pPr algn="l" defTabSz="342863" rtl="0" eaLnBrk="1" latinLnBrk="0" hangingPunct="1">
-              <a:lnSpc>
-                <a:spcPct val="90000"/>
-              </a:lnSpc>
-              <a:spcBef>
-                <a:spcPts val="250"/>
-              </a:spcBef>
-              <a:buNone/>
-              <a:defRPr lang="en-US" sz="2800" b="0" i="0" kern="1200" spc="-38" baseline="0">
-                <a:solidFill>
-                  <a:schemeClr val="tx1"/>
-                </a:solidFill>
-                <a:latin typeface="Arial"/>
-                <a:ea typeface="+mn-ea"/>
-                <a:cs typeface="Arial"/>
-              </a:defRPr>
-            </a:lvl1pPr>
-          </a:lstStyle>
-          <a:p>
-            <a:r>
-              <a:rPr lang="en-US" sz="1600" b="1" dirty="0" smtClean="0"/>
               <a:t>Running the application</a:t>
             </a:r>
             <a:endParaRPr lang="en-US" sz="1600" b="1" dirty="0"/>
@@ -6770,7 +5803,7 @@
         <p:spPr>
           <a:xfrm>
             <a:off x="2447050" y="4199082"/>
-            <a:ext cx="3096205" cy="239987"/>
+            <a:ext cx="3344671" cy="239987"/>
           </a:xfrm>
           <a:prstGeom prst="rect">
             <a:avLst/>
@@ -6799,12 +5832,12 @@
               <a:t>d </a:t>
             </a:r>
             <a:r>
-              <a:rPr lang="en-US" dirty="0" err="1" smtClean="0"/>
-              <a:t>ChassisInfoFetcher</a:t>
-            </a:r>
-            <a:r>
               <a:rPr lang="en-US" dirty="0" smtClean="0"/>
-              <a:t>; python app.py</a:t>
+              <a:t>ChassisInfoFetcher2.0; </a:t>
+            </a:r>
+            <a:r>
+              <a:rPr lang="en-US" dirty="0" smtClean="0"/>
+              <a:t>python app.py</a:t>
             </a:r>
             <a:endParaRPr lang="en-US" sz="1400" dirty="0" smtClean="0">
               <a:solidFill>
@@ -6862,7 +5895,7 @@
           <p:nvPr/>
         </p:nvPicPr>
         <p:blipFill>
-          <a:blip r:embed="rId4">
+          <a:blip r:embed="rId3">
             <a:extLst>
               <a:ext uri="{28A0092B-C50C-407E-A947-70E740481C1C}">
                 <a14:useLocalDpi xmlns:a14="http://schemas.microsoft.com/office/drawing/2010/main" val="0"/>
@@ -6903,7 +5936,7 @@
           <p:nvPr/>
         </p:nvPicPr>
         <p:blipFill>
-          <a:blip r:embed="rId5">
+          <a:blip r:embed="rId4">
             <a:extLst>
               <a:ext uri="{28A0092B-C50C-407E-A947-70E740481C1C}">
                 <a14:useLocalDpi xmlns:a14="http://schemas.microsoft.com/office/drawing/2010/main" val="0"/>
@@ -7157,7 +6190,7 @@
           <p:nvPr/>
         </p:nvPicPr>
         <p:blipFill>
-          <a:blip r:embed="rId6"/>
+          <a:blip r:embed="rId5"/>
           <a:stretch>
             <a:fillRect/>
           </a:stretch>
@@ -7181,7 +6214,7 @@
           <p:nvPr/>
         </p:nvPicPr>
         <p:blipFill>
-          <a:blip r:embed="rId7"/>
+          <a:blip r:embed="rId6"/>
           <a:stretch>
             <a:fillRect/>
           </a:stretch>

</xml_diff>